<commit_message>
Revised one last time for spelling and completeness!!
Happy Thanksgiving!!!!!!!!!!!!!!!!!!
</commit_message>
<xml_diff>
--- a/Revised Data Exploration Slide Deck.pptx
+++ b/Revised Data Exploration Slide Deck.pptx
@@ -3949,7 +3949,6 @@
               <a:rPr lang="en-US" dirty="0"/>
               <a:t>Recommendations for Future Analyses</a:t>
             </a:r>
-            <a:endParaRPr lang="en-US" dirty="0"/>
           </a:p>
         </p:txBody>
       </p:sp>
@@ -4069,18 +4068,35 @@
           <a:lstStyle/>
           <a:p>
             <a:r>
-              <a:rPr lang="en-US" dirty="0"/>
-              <a:t>The graphs of most of the variables in the TS dataset pointed to some correlation, or lack thereof, with lifetime giving. They helped sort out variables like Gender that would not contribute to the model</a:t>
-            </a:r>
-            <a:r>
-              <a:rPr lang="en-US"/>
-              <a:t>. </a:t>
-            </a:r>
-            <a:endParaRPr lang="en-US" smtClean="0"/>
-          </a:p>
-          <a:p>
-            <a:r>
-              <a:rPr lang="en-US" smtClean="0"/>
+              <a:rPr lang="en-US" dirty="0" smtClean="0"/>
+              <a:t>Alumni standing and participation in sports or a Greek chapter did not have as significant an effect on lifetime giving as I expected.</a:t>
+            </a:r>
+          </a:p>
+          <a:p>
+            <a:r>
+              <a:rPr lang="en-US" dirty="0" smtClean="0"/>
+              <a:t>Number of relationships turned out to be more influential on lifetime giving than I thought </a:t>
+            </a:r>
+            <a:r>
+              <a:rPr lang="en-US" smtClean="0"/>
+              <a:t>it would.</a:t>
+            </a:r>
+            <a:endParaRPr lang="en-US" dirty="0"/>
+          </a:p>
+          <a:p>
+            <a:r>
+              <a:rPr lang="en-US" dirty="0" smtClean="0"/>
+              <a:t>The </a:t>
+            </a:r>
+            <a:r>
+              <a:rPr lang="en-US" dirty="0"/>
+              <a:t>graphs of most of the variables in the TS dataset pointed to some correlation, or lack thereof, with lifetime giving. They helped sort out variables like Gender that would not contribute to the model. </a:t>
+            </a:r>
+            <a:endParaRPr lang="en-US" dirty="0" smtClean="0"/>
+          </a:p>
+          <a:p>
+            <a:r>
+              <a:rPr lang="en-US" dirty="0" smtClean="0"/>
               <a:t>This </a:t>
             </a:r>
             <a:r>

</xml_diff>